<commit_message>
Made the conclusion and spelled "Shakespeare" right.
</commit_message>
<xml_diff>
--- a/CEMS Poster 430.pptx
+++ b/CEMS Poster 430.pptx
@@ -212,7 +212,7 @@
 <file path=ppt/revisionInfo.xml><?xml version="1.0" encoding="utf-8"?>
 <p1510:revInfo xmlns:a="http://schemas.openxmlformats.org/drawingml/2006/main" xmlns:r="http://schemas.openxmlformats.org/officeDocument/2006/relationships" xmlns:p1510="http://schemas.microsoft.com/office/powerpoint/2015/10/main">
   <p1510:revLst>
-    <p1510:client id="{8890F3CB-2162-D141-90A2-31E65BC3766F}" v="135" dt="2024-11-02T19:30:42.442"/>
+    <p1510:client id="{D09F29F9-AF29-9F4F-F686-DCFBCE7D50FE}" v="1282" dt="2024-11-05T17:16:18.089"/>
   </p1510:revLst>
 </p1510:revInfo>
 </file>
@@ -4963,7 +4963,7 @@
           </a:extLst>
         </p:spPr>
         <p:txBody>
-          <a:bodyPr lIns="914400" tIns="457200" rIns="914400" bIns="914400"/>
+          <a:bodyPr lIns="914400" tIns="457200" rIns="914400" bIns="914400" anchor="t"/>
           <a:lstStyle>
             <a:lvl1pPr>
               <a:spcBef>
@@ -5130,76 +5130,120 @@
               </a:rPr>
               <a:t>Conclusions</a:t>
             </a:r>
-            <a:endParaRPr lang="en-US" altLang="en-US" sz="4400" b="1" dirty="0">
-              <a:latin typeface="Helvetica" pitchFamily="2" charset="0"/>
+          </a:p>
+          <a:p>
+            <a:pPr>
+              <a:spcBef>
+                <a:spcPct val="50000"/>
+              </a:spcBef>
+              <a:buNone/>
+            </a:pPr>
+            <a:r>
+              <a:rPr lang="en-US" altLang="en-US" sz="2400" dirty="0">
+                <a:solidFill>
+                  <a:srgbClr val="000000"/>
+                </a:solidFill>
+                <a:latin typeface="Helvetica"/>
+                <a:cs typeface="Helvetica"/>
+              </a:rPr>
+              <a:t>Looking at our results, we can see how well each algorithms performed with our different texts and finding "the" in our chosen texts.</a:t>
+            </a:r>
+          </a:p>
+          <a:p>
+            <a:pPr>
+              <a:spcBef>
+                <a:spcPct val="50000"/>
+              </a:spcBef>
+              <a:buNone/>
+            </a:pPr>
+            <a:r>
+              <a:rPr lang="en-US" altLang="en-US" sz="2400" dirty="0">
+                <a:solidFill>
+                  <a:srgbClr val="000000"/>
+                </a:solidFill>
+                <a:latin typeface="Helvetica"/>
+                <a:cs typeface="Helvetica"/>
+              </a:rPr>
+              <a:t>Looking at our times across all the texts, we see that no matter what scale the dataset is, the Boyer-Moore algorithm consistently runs quicker and finds the string faster than any other of the algorithms. </a:t>
+            </a:r>
+          </a:p>
+          <a:p>
+            <a:pPr>
+              <a:spcBef>
+                <a:spcPct val="50000"/>
+              </a:spcBef>
+              <a:buNone/>
+            </a:pPr>
+            <a:r>
+              <a:rPr lang="en-US" altLang="en-US" sz="2400" dirty="0">
+                <a:solidFill>
+                  <a:srgbClr val="000000"/>
+                </a:solidFill>
+                <a:latin typeface="Helvetica"/>
+                <a:cs typeface="Helvetica"/>
+              </a:rPr>
+              <a:t>When we compare the speeds of the other two algorithms, we see that the Rabin-Karp algorithm is the slowest option of the three.</a:t>
+            </a:r>
+          </a:p>
+          <a:p>
+            <a:pPr>
+              <a:spcBef>
+                <a:spcPct val="50000"/>
+              </a:spcBef>
+              <a:buNone/>
+            </a:pPr>
+            <a:r>
+              <a:rPr lang="en-US" altLang="en-US" sz="2400" dirty="0">
+                <a:solidFill>
+                  <a:srgbClr val="000000"/>
+                </a:solidFill>
+                <a:latin typeface="Helvetica"/>
+                <a:cs typeface="Helvetica"/>
+              </a:rPr>
+              <a:t>The way that Rabin-Karp works, we have an average and best-case time complexity of O(m + n) where m equals the length of the pattern, which is "the" in our case, and n is the length of the text , but in the worst-case we have a time complexity of O(</a:t>
+            </a:r>
+            <a:r>
+              <a:rPr lang="en-US" altLang="en-US" sz="2400" dirty="0" err="1">
+                <a:solidFill>
+                  <a:srgbClr val="000000"/>
+                </a:solidFill>
+                <a:latin typeface="Helvetica"/>
+                <a:cs typeface="Helvetica"/>
+              </a:rPr>
+              <a:t>mn</a:t>
+            </a:r>
+            <a:r>
+              <a:rPr lang="en-US" altLang="en-US" sz="2400" dirty="0">
+                <a:solidFill>
+                  <a:srgbClr val="000000"/>
+                </a:solidFill>
+                <a:latin typeface="Helvetica"/>
+                <a:cs typeface="Helvetica"/>
+              </a:rPr>
+              <a:t>). </a:t>
+            </a:r>
+          </a:p>
+          <a:p>
+            <a:pPr>
+              <a:spcBef>
+                <a:spcPct val="50000"/>
+              </a:spcBef>
+              <a:buNone/>
+            </a:pPr>
+            <a:r>
+              <a:rPr lang="en-US" altLang="en-US" sz="2400" dirty="0">
+                <a:solidFill>
+                  <a:srgbClr val="000000"/>
+                </a:solidFill>
+                <a:latin typeface="Helvetica"/>
+                <a:cs typeface="Helvetica"/>
+              </a:rPr>
+              <a:t>The Brute Force algorithm has the same complexity for the worst case, which means that even though they both have similar time complexities, we're getting the worst-case scenario for Rabin-Karp and a better scenario for the Brute Force algorithm.</a:t>
+            </a:r>
+            <a:endParaRPr lang="en-US" altLang="en-US" sz="2400" dirty="0">
+              <a:latin typeface="Helvetica"/>
+              <a:cs typeface="Helvetica"/>
             </a:endParaRPr>
-          </a:p>
-          <a:p>
-            <a:pPr eaLnBrk="1" hangingPunct="1">
-              <a:spcBef>
-                <a:spcPct val="10000"/>
-              </a:spcBef>
-              <a:buFontTx/>
-              <a:buNone/>
-            </a:pPr>
-            <a:r>
-              <a:rPr lang="en-US" altLang="en-US" sz="2400" dirty="0"/>
-              <a:t>You can, of course, start your conclusions in column #3 if your results section is “data light.”</a:t>
-            </a:r>
-          </a:p>
-          <a:p>
-            <a:pPr eaLnBrk="1" hangingPunct="1">
-              <a:spcBef>
-                <a:spcPct val="10000"/>
-              </a:spcBef>
-              <a:buFontTx/>
-              <a:buNone/>
-            </a:pPr>
-            <a:endParaRPr lang="en-US" altLang="en-US" sz="2400" dirty="0"/>
-          </a:p>
-          <a:p>
-            <a:pPr eaLnBrk="1" hangingPunct="1">
-              <a:spcBef>
-                <a:spcPct val="10000"/>
-              </a:spcBef>
-              <a:buFontTx/>
-              <a:buNone/>
-            </a:pPr>
-            <a:r>
-              <a:rPr lang="en-US" altLang="en-US" sz="2400" dirty="0"/>
-              <a:t>Conclusions should not be mere reminders of your results.  Instead, you want to guide the reader through what you have </a:t>
-            </a:r>
-            <a:r>
-              <a:rPr lang="en-US" altLang="en-US" sz="2400" i="1" dirty="0"/>
-              <a:t>concluded</a:t>
-            </a:r>
-            <a:r>
-              <a:rPr lang="en-US" altLang="en-US" sz="2400" dirty="0"/>
-              <a:t> from the results.  What is the broader significance?  Would anyone be mildly surprised? Why should anyone care? This section should refer back, explicitly, to the “burning issue” mentioned in the introduction. If you didn’t mention a burning issue in the introduction, go back and fix that -- your poster should have made a good case for why this experiment was worthwhile.</a:t>
-            </a:r>
-          </a:p>
-          <a:p>
-            <a:pPr eaLnBrk="1" hangingPunct="1">
-              <a:spcBef>
-                <a:spcPct val="10000"/>
-              </a:spcBef>
-              <a:buFontTx/>
-              <a:buNone/>
-            </a:pPr>
-            <a:endParaRPr lang="en-US" altLang="en-US" sz="2400" dirty="0"/>
-          </a:p>
-          <a:p>
-            <a:pPr eaLnBrk="1" hangingPunct="1">
-              <a:spcBef>
-                <a:spcPct val="10000"/>
-              </a:spcBef>
-              <a:buFontTx/>
-              <a:buNone/>
-            </a:pPr>
-            <a:r>
-              <a:rPr lang="en-US" altLang="en-US" sz="2400" dirty="0"/>
-              <a:t>Blah, blah, blah. Blah, blah, blah. Blah, blah, blah. Blah, blah, blah. Blah, blah, blah. Blah, blah, blah. Blah, blah, blah. Blah, blah, blah. Blah, blah, blah. Blah, blah, blah. Blah, blah, blah. Blah, blah, blah. Blah, blah, blah. Blah, blah, blah. Blah, blah, blah. Blah, blah, blah. Blah, blah, blah. Blah, blah, blah. Blah, blah, blah. Blah, blah, blah. Blah, blah, blah. Blah, blah, blah. Blah, blah, blah.</a:t>
-            </a:r>
           </a:p>
         </p:txBody>
       </p:sp>

</xml_diff>

<commit_message>
Added the passage for Rabin-Karp.
</commit_message>
<xml_diff>
--- a/CEMS Poster 430.pptx
+++ b/CEMS Poster 430.pptx
@@ -4716,15 +4716,7 @@
             </a:pPr>
             <a:r>
               <a:rPr lang="en-US" altLang="en-US" sz="2400" dirty="0"/>
-              <a:t>The Boyer-Moore algorithm is one of the most efficient string-matching approaches. It’s efficiency derives from its use of *Bad Character* and the *Good Suffix* rules, which decreases the number of comparisons needed to be made in a search for a pattern in a dataset . In the case of Boyer-Moore, it scans from right to left and skipping portions of the text when mismatches occur; this enables it to make large jumps, especially with unique or repetitive patterns (Figure 1). According to </a:t>
-            </a:r>
-            <a:r>
-              <a:rPr lang="en-US" altLang="en-US" sz="2400" dirty="0" err="1"/>
-              <a:t>GeeksforGeeks</a:t>
-            </a:r>
-            <a:r>
-              <a:rPr lang="en-US" altLang="en-US" sz="2400" dirty="0"/>
-              <a:t> (2024) this gives an average time complexity of (O(n/m)), where (n) is the length of the text and (m) is the length of the pattern. Hence, it is faster for typical inputs compared to algorithms such as Brute Force. It has a best-case and average time complexity of O(n/m), </a:t>
+              <a:t>Rabin-Karp algorithms utilizes hashes to save the text and pattern to check if the inputted pattern, the word “the” in our case, to check if the text contains the pattern. It uses a for loop to check if the pattern matches the hash set and if it doesn’t then the hash for the text moves up based on the length of the pattern to restart the process until either the entirety of the text is gone through or the pattern is found in the text.</a:t>
             </a:r>
           </a:p>
           <a:p>
@@ -5238,7 +5230,7 @@
                 <a:latin typeface="Helvetica"/>
                 <a:cs typeface="Helvetica"/>
               </a:rPr>
-              <a:t>The Brute Force algorithm has the same complexity for the worst case, which means that even though they both have similar time complexities, we're getting the worst-case scenario for Rabin-Karp and a better scenario for the Brute Force algorithm.</a:t>
+              <a:t>The Brute Force algorithm has the same complexity for as Rabin-Karp, but because of the overhead computing and hash checking that occurs in the Rabin-Karp code, the Brute Force algorithm ends up taking less time than Rabin-Karp.</a:t>
             </a:r>
             <a:endParaRPr lang="en-US" altLang="en-US" sz="2400" dirty="0">
               <a:latin typeface="Helvetica"/>
@@ -7366,7 +7358,7 @@
         </p:blipFill>
         <p:spPr>
           <a:xfrm>
-            <a:off x="12665868" y="24632443"/>
+            <a:off x="12665868" y="22786254"/>
             <a:ext cx="7772400" cy="3522518"/>
           </a:xfrm>
           <a:prstGeom prst="roundRect">

</xml_diff>

<commit_message>
Fixed Gavin's fuck up
</commit_message>
<xml_diff>
--- a/CEMS Poster 430.pptx
+++ b/CEMS Poster 430.pptx
@@ -4314,8 +4314,8 @@
         </p:nvSpPr>
         <p:spPr bwMode="auto">
           <a:xfrm>
-            <a:off x="11868150" y="7256463"/>
-            <a:ext cx="9367838" cy="23604537"/>
+            <a:off x="10025776" y="7256463"/>
+            <a:ext cx="11950702" cy="23604537"/>
           </a:xfrm>
           <a:prstGeom prst="rect">
             <a:avLst/>
@@ -4525,19 +4525,19 @@
               <a:buNone/>
             </a:pPr>
             <a:r>
-              <a:rPr lang="en-US" altLang="en-US" sz="2400" dirty="0">
+              <a:rPr lang="en-US" altLang="en-US" sz="1800" dirty="0">
                 <a:latin typeface="+mn-lt"/>
               </a:rPr>
               <a:t>The Boyer-Moore algorithm is an efficient string-matching method known for its use of Bad Character and Good Suffix rules, which reduce the number of comparisons needed when searching for a pattern in a dataset. It scans from right to left and can skip portions of the text on mismatches, allowing for large jumps, particularly with unique or repetitive patterns (Figure 1). This results in an average time complexity of O(n/m), where (n) is the text length and (m) is the pattern length (</a:t>
             </a:r>
             <a:r>
-              <a:rPr lang="en-US" altLang="en-US" sz="2400" dirty="0" err="1">
+              <a:rPr lang="en-US" altLang="en-US" sz="1800" dirty="0" err="1">
                 <a:latin typeface="+mn-lt"/>
               </a:rPr>
               <a:t>GeeksforGeeks</a:t>
             </a:r>
             <a:r>
-              <a:rPr lang="en-US" altLang="en-US" sz="2400" dirty="0">
+              <a:rPr lang="en-US" altLang="en-US" sz="1800" dirty="0">
                 <a:latin typeface="+mn-lt"/>
               </a:rPr>
               <a:t>, 2024). While it has a worst-case complexity of O(n*m) for repetitive sequences, its efficiency in practical applications makes it a preferred choice for string matching, especially with large datasets. </a:t>
@@ -4715,7 +4715,7 @@
               <a:buNone/>
             </a:pPr>
             <a:r>
-              <a:rPr lang="en-US" altLang="en-US" sz="2400" dirty="0"/>
+              <a:rPr lang="en-US" altLang="en-US" sz="1800" dirty="0"/>
               <a:t>Rabin-Karp algorithms utilizes hashes to save the text and pattern to check if the inputted pattern, the word “the” in our case, to check if the text contains the pattern. It uses a for loop to check if the pattern matches the hash set and if it doesn’t then the hash for the text moves up based on the length of the pattern to restart the process until either the entirety of the text is gone through or the pattern is found in the text.</a:t>
             </a:r>
           </a:p>
@@ -4870,25 +4870,16 @@
             </a:endParaRPr>
           </a:p>
           <a:p>
-            <a:pPr marL="0" marR="0" lvl="0" indent="0" algn="l" defTabSz="914400" rtl="0" eaLnBrk="1" fontAlgn="base" latinLnBrk="0" hangingPunct="1">
-              <a:lnSpc>
-                <a:spcPct val="100000"/>
-              </a:lnSpc>
+            <a:pPr eaLnBrk="1" hangingPunct="1">
               <a:spcBef>
                 <a:spcPct val="10000"/>
               </a:spcBef>
-              <a:spcAft>
-                <a:spcPct val="0"/>
-              </a:spcAft>
-              <a:buClrTx/>
-              <a:buSzTx/>
-              <a:buFontTx/>
               <a:buNone/>
               <a:tabLst/>
               <a:defRPr/>
             </a:pPr>
             <a:r>
-              <a:rPr kumimoji="0" lang="en-US" altLang="en-US" sz="2400" b="0" i="0" u="none" strike="noStrike" kern="1200" cap="none" spc="0" normalizeH="0" baseline="0" noProof="0" dirty="0">
+              <a:rPr kumimoji="0" lang="en-US" altLang="en-US" sz="1800" b="0" i="0" u="none" strike="noStrike" kern="1200" cap="none" spc="0" normalizeH="0" baseline="0" noProof="0" dirty="0">
                 <a:ln>
                   <a:noFill/>
                 </a:ln>
@@ -4902,9 +4893,96 @@
                 <a:ea typeface="+mn-ea"/>
                 <a:cs typeface="+mn-cs"/>
               </a:rPr>
-              <a:t>The Boyer-Moore algorithm is one of the most efficient string-matching approaches. It’s efficiency derives from its use of *Bad Character* and the *Good Suffix* rules, which decreases the number of comparisons needed to</a:t>
-            </a:r>
-            <a:endParaRPr lang="en-US" altLang="en-US" sz="2400" dirty="0"/>
+              <a:t>The Boyer-Moore algorithm is one of the most efficient string-matching approaches. It’s efficiency derives from its use of *Bad Character* and the *Good Suffix* rules, which decreases the number of comparisons needed </a:t>
+            </a:r>
+            <a:r>
+              <a:rPr kumimoji="0" lang="en-US" altLang="en-US" sz="1800" b="0" i="0" u="none" strike="noStrike" kern="1200" cap="none" spc="0" normalizeH="0" baseline="0" noProof="0" dirty="0" err="1">
+                <a:ln>
+                  <a:noFill/>
+                </a:ln>
+                <a:solidFill>
+                  <a:srgbClr val="000000"/>
+                </a:solidFill>
+                <a:effectLst/>
+                <a:uLnTx/>
+                <a:uFillTx/>
+                <a:latin typeface="Helvetica" pitchFamily="2" charset="0"/>
+                <a:ea typeface="+mn-ea"/>
+                <a:cs typeface="+mn-cs"/>
+              </a:rPr>
+              <a:t>tobe</a:t>
+            </a:r>
+            <a:r>
+              <a:rPr kumimoji="0" lang="en-US" altLang="en-US" sz="1800" b="0" i="0" u="none" strike="noStrike" kern="1200" cap="none" spc="0" normalizeH="0" baseline="0" noProof="0" dirty="0">
+                <a:ln>
+                  <a:noFill/>
+                </a:ln>
+                <a:solidFill>
+                  <a:srgbClr val="000000"/>
+                </a:solidFill>
+                <a:effectLst/>
+                <a:uLnTx/>
+                <a:uFillTx/>
+                <a:latin typeface="Helvetica" pitchFamily="2" charset="0"/>
+                <a:ea typeface="+mn-ea"/>
+                <a:cs typeface="+mn-cs"/>
+              </a:rPr>
+              <a:t> made in a search for a pattern in a dataset . In the case of Boyer-Moore, it scans from right to left and skipping portions of the text when mismatches occur; this enables it to make large jumps, especially with unique or repetitive patterns (Figure 1). According to </a:t>
+            </a:r>
+            <a:r>
+              <a:rPr kumimoji="0" lang="en-US" altLang="en-US" sz="1800" b="0" i="0" u="none" strike="noStrike" kern="1200" cap="none" spc="0" normalizeH="0" baseline="0" noProof="0" dirty="0" err="1">
+                <a:ln>
+                  <a:noFill/>
+                </a:ln>
+                <a:solidFill>
+                  <a:srgbClr val="000000"/>
+                </a:solidFill>
+                <a:effectLst/>
+                <a:uLnTx/>
+                <a:uFillTx/>
+                <a:latin typeface="Helvetica" pitchFamily="2" charset="0"/>
+                <a:ea typeface="+mn-ea"/>
+                <a:cs typeface="+mn-cs"/>
+              </a:rPr>
+              <a:t>GeeksforGeeks</a:t>
+            </a:r>
+            <a:r>
+              <a:rPr kumimoji="0" lang="en-US" altLang="en-US" sz="1800" b="0" i="0" u="none" strike="noStrike" kern="1200" cap="none" spc="0" normalizeH="0" baseline="0" noProof="0" dirty="0">
+                <a:ln>
+                  <a:noFill/>
+                </a:ln>
+                <a:solidFill>
+                  <a:srgbClr val="000000"/>
+                </a:solidFill>
+                <a:effectLst/>
+                <a:uLnTx/>
+                <a:uFillTx/>
+                <a:latin typeface="Helvetica" pitchFamily="2" charset="0"/>
+                <a:ea typeface="+mn-ea"/>
+                <a:cs typeface="+mn-cs"/>
+              </a:rPr>
+              <a:t> (2024) this gives an average time complexity of (O(n/m)), where (n) is the length of the text and (m) is the length of the pattern. Hence, it is faster for typical inputs compared to algorithms such as Brute Force.</a:t>
+            </a:r>
+          </a:p>
+          <a:p>
+            <a:pPr marL="0" marR="0" lvl="0" indent="0" algn="l" defTabSz="914400" rtl="0" eaLnBrk="1" fontAlgn="base" latinLnBrk="0" hangingPunct="1">
+              <a:lnSpc>
+                <a:spcPct val="100000"/>
+              </a:lnSpc>
+              <a:spcBef>
+                <a:spcPct val="10000"/>
+              </a:spcBef>
+              <a:spcAft>
+                <a:spcPct val="0"/>
+              </a:spcAft>
+              <a:buClrTx/>
+              <a:buSzTx/>
+              <a:buFontTx/>
+              <a:buNone/>
+              <a:tabLst/>
+              <a:defRPr/>
+            </a:pPr>
+            <a:endParaRPr lang="en-US" altLang="en-US" sz="1800" dirty="0"/>
           </a:p>
         </p:txBody>
       </p:sp>
@@ -4925,7 +5003,7 @@
         <p:spPr bwMode="auto">
           <a:xfrm>
             <a:off x="33856613" y="7256462"/>
-            <a:ext cx="9010650" cy="13849349"/>
+            <a:ext cx="9010650" cy="15011400"/>
           </a:xfrm>
           <a:prstGeom prst="rect">
             <a:avLst/>
@@ -6852,8 +6930,8 @@
         </p:nvSpPr>
         <p:spPr bwMode="auto">
           <a:xfrm>
-            <a:off x="22757535" y="7256462"/>
-            <a:ext cx="9367838" cy="23604537"/>
+            <a:off x="21945600" y="7256462"/>
+            <a:ext cx="11950702" cy="23604537"/>
           </a:xfrm>
           <a:prstGeom prst="rect">
             <a:avLst/>
@@ -7034,175 +7112,6 @@
             </a:lvl9pPr>
           </a:lstStyle>
           <a:p>
-            <a:pPr marL="0" marR="0" lvl="0" indent="0" algn="just" defTabSz="914400" rtl="0" eaLnBrk="1" fontAlgn="base" latinLnBrk="0" hangingPunct="1">
-              <a:lnSpc>
-                <a:spcPct val="100000"/>
-              </a:lnSpc>
-              <a:spcBef>
-                <a:spcPct val="0"/>
-              </a:spcBef>
-              <a:spcAft>
-                <a:spcPct val="0"/>
-              </a:spcAft>
-              <a:buClrTx/>
-              <a:buSzTx/>
-              <a:buFontTx/>
-              <a:buNone/>
-              <a:tabLst/>
-              <a:defRPr/>
-            </a:pPr>
-            <a:r>
-              <a:rPr kumimoji="0" lang="en-US" altLang="en-US" sz="2400" b="0" i="0" u="none" strike="noStrike" kern="1200" cap="none" spc="0" normalizeH="0" baseline="0" noProof="0" dirty="0">
-                <a:ln>
-                  <a:noFill/>
-                </a:ln>
-                <a:solidFill>
-                  <a:srgbClr val="000000"/>
-                </a:solidFill>
-                <a:effectLst/>
-                <a:uLnTx/>
-                <a:uFillTx/>
-                <a:latin typeface="Helvetica" pitchFamily="2" charset="0"/>
-                <a:ea typeface="+mn-ea"/>
-                <a:cs typeface="+mn-cs"/>
-              </a:rPr>
-              <a:t>be made in a search for a pattern in a dataset . In the case of Boyer-Moore, it scans from right to left and skipping portions of the text when mismatches occur; this enables it to make large jumps, especially with unique or repetitive patterns (Figure 1). According to </a:t>
-            </a:r>
-            <a:r>
-              <a:rPr kumimoji="0" lang="en-US" altLang="en-US" sz="2400" b="0" i="0" u="none" strike="noStrike" kern="1200" cap="none" spc="0" normalizeH="0" baseline="0" noProof="0" dirty="0" err="1">
-                <a:ln>
-                  <a:noFill/>
-                </a:ln>
-                <a:solidFill>
-                  <a:srgbClr val="000000"/>
-                </a:solidFill>
-                <a:effectLst/>
-                <a:uLnTx/>
-                <a:uFillTx/>
-                <a:latin typeface="Helvetica" pitchFamily="2" charset="0"/>
-                <a:ea typeface="+mn-ea"/>
-                <a:cs typeface="+mn-cs"/>
-              </a:rPr>
-              <a:t>GeeksforGeeks</a:t>
-            </a:r>
-            <a:r>
-              <a:rPr kumimoji="0" lang="en-US" altLang="en-US" sz="2400" b="0" i="0" u="none" strike="noStrike" kern="1200" cap="none" spc="0" normalizeH="0" baseline="0" noProof="0" dirty="0">
-                <a:ln>
-                  <a:noFill/>
-                </a:ln>
-                <a:solidFill>
-                  <a:srgbClr val="000000"/>
-                </a:solidFill>
-                <a:effectLst/>
-                <a:uLnTx/>
-                <a:uFillTx/>
-                <a:latin typeface="Helvetica" pitchFamily="2" charset="0"/>
-                <a:ea typeface="+mn-ea"/>
-                <a:cs typeface="+mn-cs"/>
-              </a:rPr>
-              <a:t> (2024) this gives an average time complexity of (O(n/m)), where (n) is the length of the text and (m) is the length of the pattern. Hence, it is faster for typical inputs compared to algorithms such as Brute Force.</a:t>
-            </a:r>
-          </a:p>
-          <a:p>
-            <a:pPr algn="just" eaLnBrk="1" hangingPunct="1">
-              <a:spcBef>
-                <a:spcPct val="0"/>
-              </a:spcBef>
-              <a:buNone/>
-            </a:pPr>
-            <a:endParaRPr lang="en-US" altLang="en-US" sz="4400" b="1" dirty="0">
-              <a:solidFill>
-                <a:srgbClr val="FF8000"/>
-              </a:solidFill>
-              <a:latin typeface="Helvetica" pitchFamily="2" charset="0"/>
-            </a:endParaRPr>
-          </a:p>
-          <a:p>
-            <a:pPr algn="just" eaLnBrk="1" hangingPunct="1">
-              <a:spcBef>
-                <a:spcPct val="0"/>
-              </a:spcBef>
-              <a:buNone/>
-            </a:pPr>
-            <a:endParaRPr lang="en-US" altLang="en-US" sz="4400" b="1" dirty="0">
-              <a:solidFill>
-                <a:srgbClr val="FF8000"/>
-              </a:solidFill>
-              <a:latin typeface="Helvetica" pitchFamily="2" charset="0"/>
-            </a:endParaRPr>
-          </a:p>
-          <a:p>
-            <a:pPr algn="just" eaLnBrk="1" hangingPunct="1">
-              <a:spcBef>
-                <a:spcPct val="0"/>
-              </a:spcBef>
-              <a:buNone/>
-            </a:pPr>
-            <a:endParaRPr lang="en-US" altLang="en-US" sz="4400" b="1" dirty="0">
-              <a:solidFill>
-                <a:srgbClr val="FF8000"/>
-              </a:solidFill>
-              <a:latin typeface="Helvetica" pitchFamily="2" charset="0"/>
-            </a:endParaRPr>
-          </a:p>
-          <a:p>
-            <a:pPr algn="just" eaLnBrk="1" hangingPunct="1">
-              <a:spcBef>
-                <a:spcPct val="0"/>
-              </a:spcBef>
-              <a:buNone/>
-            </a:pPr>
-            <a:endParaRPr lang="en-US" altLang="en-US" sz="4400" b="1" dirty="0">
-              <a:solidFill>
-                <a:srgbClr val="FF8000"/>
-              </a:solidFill>
-              <a:latin typeface="Helvetica" pitchFamily="2" charset="0"/>
-            </a:endParaRPr>
-          </a:p>
-          <a:p>
-            <a:pPr algn="just" eaLnBrk="1" hangingPunct="1">
-              <a:spcBef>
-                <a:spcPct val="0"/>
-              </a:spcBef>
-              <a:buNone/>
-            </a:pPr>
-            <a:endParaRPr lang="en-US" altLang="en-US" sz="4400" b="1" dirty="0">
-              <a:solidFill>
-                <a:srgbClr val="FF8000"/>
-              </a:solidFill>
-              <a:latin typeface="Helvetica" pitchFamily="2" charset="0"/>
-            </a:endParaRPr>
-          </a:p>
-          <a:p>
-            <a:pPr algn="just" eaLnBrk="1" hangingPunct="1">
-              <a:spcBef>
-                <a:spcPct val="0"/>
-              </a:spcBef>
-              <a:buNone/>
-            </a:pPr>
-            <a:endParaRPr lang="en-US" altLang="en-US" sz="4400" b="1" dirty="0">
-              <a:solidFill>
-                <a:srgbClr val="FF8000"/>
-              </a:solidFill>
-              <a:latin typeface="Helvetica" pitchFamily="2" charset="0"/>
-            </a:endParaRPr>
-          </a:p>
-          <a:p>
-            <a:pPr algn="just" eaLnBrk="1" hangingPunct="1">
-              <a:spcBef>
-                <a:spcPct val="0"/>
-              </a:spcBef>
-              <a:buFontTx/>
-              <a:buNone/>
-            </a:pPr>
-            <a:endParaRPr lang="en-US" altLang="en-US" sz="4400" b="1" dirty="0">
-              <a:solidFill>
-                <a:srgbClr val="FF8000"/>
-              </a:solidFill>
-              <a:latin typeface="Helvetica" pitchFamily="2" charset="0"/>
-            </a:endParaRPr>
-          </a:p>
-          <a:p>
             <a:pPr algn="just" eaLnBrk="1" hangingPunct="1">
               <a:spcBef>
                 <a:spcPct val="0"/>
@@ -7252,6 +7161,136 @@
               <a:buFontTx/>
               <a:buNone/>
             </a:pPr>
+            <a:endParaRPr lang="en-US" altLang="en-US" sz="2400" dirty="0"/>
+          </a:p>
+          <a:p>
+            <a:pPr eaLnBrk="1" hangingPunct="1">
+              <a:spcBef>
+                <a:spcPct val="10000"/>
+              </a:spcBef>
+              <a:buFontTx/>
+              <a:buNone/>
+            </a:pPr>
+            <a:endParaRPr lang="en-US" altLang="en-US" sz="2400" dirty="0"/>
+          </a:p>
+          <a:p>
+            <a:pPr eaLnBrk="1" hangingPunct="1">
+              <a:spcBef>
+                <a:spcPct val="10000"/>
+              </a:spcBef>
+              <a:buFontTx/>
+              <a:buNone/>
+            </a:pPr>
+            <a:endParaRPr lang="en-US" altLang="en-US" sz="2400" dirty="0"/>
+          </a:p>
+          <a:p>
+            <a:pPr eaLnBrk="1" hangingPunct="1">
+              <a:spcBef>
+                <a:spcPct val="10000"/>
+              </a:spcBef>
+              <a:buFontTx/>
+              <a:buNone/>
+            </a:pPr>
+            <a:endParaRPr lang="en-US" altLang="en-US" sz="2400" dirty="0"/>
+          </a:p>
+          <a:p>
+            <a:pPr eaLnBrk="1" hangingPunct="1">
+              <a:spcBef>
+                <a:spcPct val="10000"/>
+              </a:spcBef>
+              <a:buFontTx/>
+              <a:buNone/>
+            </a:pPr>
+            <a:endParaRPr lang="en-US" altLang="en-US" sz="2400" dirty="0"/>
+          </a:p>
+          <a:p>
+            <a:pPr eaLnBrk="1" hangingPunct="1">
+              <a:spcBef>
+                <a:spcPct val="10000"/>
+              </a:spcBef>
+              <a:buFontTx/>
+              <a:buNone/>
+            </a:pPr>
+            <a:endParaRPr lang="en-US" altLang="en-US" sz="2400" dirty="0"/>
+          </a:p>
+          <a:p>
+            <a:pPr eaLnBrk="1" hangingPunct="1">
+              <a:spcBef>
+                <a:spcPct val="10000"/>
+              </a:spcBef>
+              <a:buFontTx/>
+              <a:buNone/>
+            </a:pPr>
+            <a:endParaRPr lang="en-US" altLang="en-US" sz="2400" dirty="0"/>
+          </a:p>
+          <a:p>
+            <a:pPr eaLnBrk="1" hangingPunct="1">
+              <a:spcBef>
+                <a:spcPct val="10000"/>
+              </a:spcBef>
+              <a:buFontTx/>
+              <a:buNone/>
+            </a:pPr>
+            <a:endParaRPr lang="en-US" altLang="en-US" sz="2400" dirty="0"/>
+          </a:p>
+          <a:p>
+            <a:pPr eaLnBrk="1" hangingPunct="1">
+              <a:spcBef>
+                <a:spcPct val="10000"/>
+              </a:spcBef>
+              <a:buFontTx/>
+              <a:buNone/>
+            </a:pPr>
+            <a:endParaRPr lang="en-US" altLang="en-US" sz="2400" dirty="0"/>
+          </a:p>
+          <a:p>
+            <a:pPr eaLnBrk="1" hangingPunct="1">
+              <a:spcBef>
+                <a:spcPct val="10000"/>
+              </a:spcBef>
+              <a:buFontTx/>
+              <a:buNone/>
+            </a:pPr>
+            <a:endParaRPr lang="en-US" altLang="en-US" sz="2400" dirty="0"/>
+          </a:p>
+          <a:p>
+            <a:pPr eaLnBrk="1" hangingPunct="1">
+              <a:spcBef>
+                <a:spcPct val="10000"/>
+              </a:spcBef>
+              <a:buFontTx/>
+              <a:buNone/>
+            </a:pPr>
+            <a:endParaRPr lang="en-US" altLang="en-US" sz="2400" dirty="0"/>
+          </a:p>
+          <a:p>
+            <a:pPr eaLnBrk="1" hangingPunct="1">
+              <a:spcBef>
+                <a:spcPct val="10000"/>
+              </a:spcBef>
+              <a:buFontTx/>
+              <a:buNone/>
+            </a:pPr>
+            <a:endParaRPr lang="en-US" altLang="en-US" sz="2400" dirty="0"/>
+          </a:p>
+          <a:p>
+            <a:pPr eaLnBrk="1" hangingPunct="1">
+              <a:spcBef>
+                <a:spcPct val="10000"/>
+              </a:spcBef>
+              <a:buFontTx/>
+              <a:buNone/>
+            </a:pPr>
+            <a:endParaRPr lang="en-US" altLang="en-US" sz="2400" dirty="0"/>
+          </a:p>
+          <a:p>
+            <a:pPr eaLnBrk="1" hangingPunct="1">
+              <a:spcBef>
+                <a:spcPct val="10000"/>
+              </a:spcBef>
+              <a:buFontTx/>
+              <a:buNone/>
+            </a:pPr>
             <a:r>
               <a:rPr lang="en-US" altLang="en-US" sz="4400" b="1" dirty="0">
                 <a:solidFill>
@@ -7285,6 +7324,126 @@
               <a:rPr lang="en-US" altLang="en-US" sz="2400" dirty="0"/>
               <a:t> characters, this modern dialogue-heavy text provides a moderate-sized dataset for testing. The conversational format and repetitive dialogue patterns help evaluate an algorithm’s ability to manage redundancy and handle moderately large text files.</a:t>
             </a:r>
+          </a:p>
+          <a:p>
+            <a:pPr eaLnBrk="1" hangingPunct="1">
+              <a:spcBef>
+                <a:spcPct val="10000"/>
+              </a:spcBef>
+              <a:buFontTx/>
+              <a:buNone/>
+            </a:pPr>
+            <a:endParaRPr lang="en-US" altLang="en-US" sz="2400" dirty="0"/>
+          </a:p>
+          <a:p>
+            <a:pPr eaLnBrk="1" hangingPunct="1">
+              <a:spcBef>
+                <a:spcPct val="10000"/>
+              </a:spcBef>
+              <a:buFontTx/>
+              <a:buNone/>
+            </a:pPr>
+            <a:endParaRPr lang="en-US" altLang="en-US" sz="2400" dirty="0"/>
+          </a:p>
+          <a:p>
+            <a:pPr eaLnBrk="1" hangingPunct="1">
+              <a:spcBef>
+                <a:spcPct val="10000"/>
+              </a:spcBef>
+              <a:buFontTx/>
+              <a:buNone/>
+            </a:pPr>
+            <a:endParaRPr lang="en-US" altLang="en-US" sz="2400" dirty="0"/>
+          </a:p>
+          <a:p>
+            <a:pPr eaLnBrk="1" hangingPunct="1">
+              <a:spcBef>
+                <a:spcPct val="10000"/>
+              </a:spcBef>
+              <a:buFontTx/>
+              <a:buNone/>
+            </a:pPr>
+            <a:endParaRPr lang="en-US" altLang="en-US" sz="2400" dirty="0"/>
+          </a:p>
+          <a:p>
+            <a:pPr eaLnBrk="1" hangingPunct="1">
+              <a:spcBef>
+                <a:spcPct val="10000"/>
+              </a:spcBef>
+              <a:buFontTx/>
+              <a:buNone/>
+            </a:pPr>
+            <a:endParaRPr lang="en-US" altLang="en-US" sz="2400" dirty="0"/>
+          </a:p>
+          <a:p>
+            <a:pPr eaLnBrk="1" hangingPunct="1">
+              <a:spcBef>
+                <a:spcPct val="10000"/>
+              </a:spcBef>
+              <a:buFontTx/>
+              <a:buNone/>
+            </a:pPr>
+            <a:endParaRPr lang="en-US" altLang="en-US" sz="2400" dirty="0"/>
+          </a:p>
+          <a:p>
+            <a:pPr eaLnBrk="1" hangingPunct="1">
+              <a:spcBef>
+                <a:spcPct val="10000"/>
+              </a:spcBef>
+              <a:buFontTx/>
+              <a:buNone/>
+            </a:pPr>
+            <a:endParaRPr lang="en-US" altLang="en-US" sz="2400" dirty="0"/>
+          </a:p>
+          <a:p>
+            <a:pPr eaLnBrk="1" hangingPunct="1">
+              <a:spcBef>
+                <a:spcPct val="10000"/>
+              </a:spcBef>
+              <a:buFontTx/>
+              <a:buNone/>
+            </a:pPr>
+            <a:endParaRPr lang="en-US" altLang="en-US" sz="2400" dirty="0"/>
+          </a:p>
+          <a:p>
+            <a:pPr eaLnBrk="1" hangingPunct="1">
+              <a:spcBef>
+                <a:spcPct val="10000"/>
+              </a:spcBef>
+              <a:buFontTx/>
+              <a:buNone/>
+            </a:pPr>
+            <a:endParaRPr lang="en-US" altLang="en-US" sz="2400" dirty="0"/>
+          </a:p>
+          <a:p>
+            <a:pPr eaLnBrk="1" hangingPunct="1">
+              <a:spcBef>
+                <a:spcPct val="10000"/>
+              </a:spcBef>
+              <a:buFontTx/>
+              <a:buNone/>
+            </a:pPr>
+            <a:endParaRPr lang="en-US" altLang="en-US" sz="2400" dirty="0"/>
+          </a:p>
+          <a:p>
+            <a:pPr eaLnBrk="1" hangingPunct="1">
+              <a:spcBef>
+                <a:spcPct val="10000"/>
+              </a:spcBef>
+              <a:buFontTx/>
+              <a:buNone/>
+            </a:pPr>
+            <a:endParaRPr lang="en-US" altLang="en-US" sz="2400" dirty="0"/>
+          </a:p>
+          <a:p>
+            <a:pPr eaLnBrk="1" hangingPunct="1">
+              <a:spcBef>
+                <a:spcPct val="10000"/>
+              </a:spcBef>
+              <a:buFontTx/>
+              <a:buNone/>
+            </a:pPr>
+            <a:endParaRPr lang="en-US" altLang="en-US" sz="2400" dirty="0"/>
           </a:p>
           <a:p>
             <a:pPr eaLnBrk="1" hangingPunct="1">
@@ -7358,7 +7517,7 @@
         </p:blipFill>
         <p:spPr>
           <a:xfrm>
-            <a:off x="12665868" y="22786254"/>
+            <a:off x="10984091" y="19058730"/>
             <a:ext cx="7772400" cy="3522518"/>
           </a:xfrm>
           <a:prstGeom prst="roundRect">
@@ -7407,7 +7566,7 @@
         </p:blipFill>
         <p:spPr>
           <a:xfrm>
-            <a:off x="23555254" y="11500161"/>
+            <a:off x="11019694" y="26051787"/>
             <a:ext cx="7772400" cy="4236505"/>
           </a:xfrm>
           <a:prstGeom prst="roundRect">
@@ -7455,7 +7614,7 @@
         </p:blipFill>
         <p:spPr>
           <a:xfrm>
-            <a:off x="13170625" y="13009766"/>
+            <a:off x="10840245" y="10866070"/>
             <a:ext cx="6212716" cy="5755731"/>
           </a:xfrm>
           <a:prstGeom prst="roundRect">
@@ -7474,6 +7633,150 @@
           <a:effectLst>
             <a:reflection blurRad="12700" endPos="0" dist="5000" dir="5400000" sy="-100000" algn="bl" rotWithShape="0"/>
           </a:effectLst>
+        </p:spPr>
+      </p:pic>
+      <p:pic>
+        <p:nvPicPr>
+          <p:cNvPr id="3" name="Picture 2" descr="A graph showing the number of companies&#10;&#10;Description automatically generated">
+            <a:extLst>
+              <a:ext uri="{FF2B5EF4-FFF2-40B4-BE49-F238E27FC236}">
+                <a16:creationId xmlns:a16="http://schemas.microsoft.com/office/drawing/2014/main" id="{F0A94F6E-D51D-256A-DE0A-EDD565BF7817}"/>
+              </a:ext>
+            </a:extLst>
+          </p:cNvPr>
+          <p:cNvPicPr>
+            <a:picLocks noChangeAspect="1"/>
+          </p:cNvPicPr>
+          <p:nvPr/>
+        </p:nvPicPr>
+        <p:blipFill>
+          <a:blip r:embed="rId12">
+            <a:extLst>
+              <a:ext uri="{28A0092B-C50C-407E-A947-70E740481C1C}">
+                <a14:useLocalDpi xmlns:a14="http://schemas.microsoft.com/office/drawing/2010/main" val="0"/>
+              </a:ext>
+            </a:extLst>
+          </a:blip>
+          <a:stretch>
+            <a:fillRect/>
+          </a:stretch>
+        </p:blipFill>
+        <p:spPr>
+          <a:xfrm>
+            <a:off x="22774198" y="10085363"/>
+            <a:ext cx="7005839" cy="3975406"/>
+          </a:xfrm>
+          <a:prstGeom prst="rect">
+            <a:avLst/>
+          </a:prstGeom>
+        </p:spPr>
+      </p:pic>
+      <p:pic>
+        <p:nvPicPr>
+          <p:cNvPr id="10" name="Picture 9" descr="A graph showing the number of lottery&#10;&#10;Description automatically generated">
+            <a:extLst>
+              <a:ext uri="{FF2B5EF4-FFF2-40B4-BE49-F238E27FC236}">
+                <a16:creationId xmlns:a16="http://schemas.microsoft.com/office/drawing/2014/main" id="{0D0592E3-FC91-BE08-6452-A9DC1A589428}"/>
+              </a:ext>
+            </a:extLst>
+          </p:cNvPr>
+          <p:cNvPicPr>
+            <a:picLocks noChangeAspect="1"/>
+          </p:cNvPicPr>
+          <p:nvPr/>
+        </p:nvPicPr>
+        <p:blipFill>
+          <a:blip r:embed="rId13">
+            <a:extLst>
+              <a:ext uri="{28A0092B-C50C-407E-A947-70E740481C1C}">
+                <a14:useLocalDpi xmlns:a14="http://schemas.microsoft.com/office/drawing/2010/main" val="0"/>
+              </a:ext>
+            </a:extLst>
+          </a:blip>
+          <a:stretch>
+            <a:fillRect/>
+          </a:stretch>
+        </p:blipFill>
+        <p:spPr>
+          <a:xfrm>
+            <a:off x="22774198" y="24538900"/>
+            <a:ext cx="6841136" cy="3863975"/>
+          </a:xfrm>
+          <a:prstGeom prst="rect">
+            <a:avLst/>
+          </a:prstGeom>
+        </p:spPr>
+      </p:pic>
+      <p:pic>
+        <p:nvPicPr>
+          <p:cNvPr id="12" name="Picture 11" descr="A graph of different colored lines&#10;&#10;Description automatically generated">
+            <a:extLst>
+              <a:ext uri="{FF2B5EF4-FFF2-40B4-BE49-F238E27FC236}">
+                <a16:creationId xmlns:a16="http://schemas.microsoft.com/office/drawing/2014/main" id="{EBE63C11-150E-8E5A-3914-8F6F5180DB0F}"/>
+              </a:ext>
+            </a:extLst>
+          </p:cNvPr>
+          <p:cNvPicPr>
+            <a:picLocks noChangeAspect="1"/>
+          </p:cNvPicPr>
+          <p:nvPr/>
+        </p:nvPicPr>
+        <p:blipFill>
+          <a:blip r:embed="rId14">
+            <a:extLst>
+              <a:ext uri="{28A0092B-C50C-407E-A947-70E740481C1C}">
+                <a14:useLocalDpi xmlns:a14="http://schemas.microsoft.com/office/drawing/2010/main" val="0"/>
+              </a:ext>
+            </a:extLst>
+          </a:blip>
+          <a:stretch>
+            <a:fillRect/>
+          </a:stretch>
+        </p:blipFill>
+        <p:spPr>
+          <a:xfrm>
+            <a:off x="22774198" y="17326392"/>
+            <a:ext cx="7022131" cy="3975406"/>
+          </a:xfrm>
+          <a:prstGeom prst="rect">
+            <a:avLst/>
+          </a:prstGeom>
+        </p:spPr>
+      </p:pic>
+      <p:pic>
+        <p:nvPicPr>
+          <p:cNvPr id="14" name="Picture 13" descr="A graph with different colored bars&#10;&#10;Description automatically generated">
+            <a:extLst>
+              <a:ext uri="{FF2B5EF4-FFF2-40B4-BE49-F238E27FC236}">
+                <a16:creationId xmlns:a16="http://schemas.microsoft.com/office/drawing/2014/main" id="{6448F024-8EBB-8784-FED0-545902BB574B}"/>
+              </a:ext>
+            </a:extLst>
+          </p:cNvPr>
+          <p:cNvPicPr>
+            <a:picLocks noChangeAspect="1"/>
+          </p:cNvPicPr>
+          <p:nvPr/>
+        </p:nvPicPr>
+        <p:blipFill>
+          <a:blip r:embed="rId15">
+            <a:extLst>
+              <a:ext uri="{28A0092B-C50C-407E-A947-70E740481C1C}">
+                <a14:useLocalDpi xmlns:a14="http://schemas.microsoft.com/office/drawing/2010/main" val="0"/>
+              </a:ext>
+            </a:extLst>
+          </a:blip>
+          <a:stretch>
+            <a:fillRect/>
+          </a:stretch>
+        </p:blipFill>
+        <p:spPr>
+          <a:xfrm>
+            <a:off x="34666778" y="17308232"/>
+            <a:ext cx="7379811" cy="4197375"/>
+          </a:xfrm>
+          <a:prstGeom prst="rect">
+            <a:avLst/>
+          </a:prstGeom>
         </p:spPr>
       </p:pic>
     </p:spTree>

</xml_diff>

<commit_message>
made the images light mode
</commit_message>
<xml_diff>
--- a/CEMS Poster 430.pptx
+++ b/CEMS Poster 430.pptx
@@ -7433,152 +7433,6 @@
       </p:sp>
       <p:pic>
         <p:nvPicPr>
-          <p:cNvPr id="7" name="Picture 6" descr="A computer screen shot of a program code&#10;&#10;Description automatically generated">
-            <a:extLst>
-              <a:ext uri="{FF2B5EF4-FFF2-40B4-BE49-F238E27FC236}">
-                <a16:creationId xmlns:a16="http://schemas.microsoft.com/office/drawing/2014/main" id="{55F1AF95-9D55-5000-2AD9-CB27D33AF939}"/>
-              </a:ext>
-            </a:extLst>
-          </p:cNvPr>
-          <p:cNvPicPr>
-            <a:picLocks noChangeAspect="1"/>
-          </p:cNvPicPr>
-          <p:nvPr/>
-        </p:nvPicPr>
-        <p:blipFill>
-          <a:blip r:embed="rId8">
-            <a:extLst>
-              <a:ext uri="{28A0092B-C50C-407E-A947-70E740481C1C}">
-                <a14:useLocalDpi xmlns:a14="http://schemas.microsoft.com/office/drawing/2010/main" val="0"/>
-              </a:ext>
-            </a:extLst>
-          </a:blip>
-          <a:stretch>
-            <a:fillRect/>
-          </a:stretch>
-        </p:blipFill>
-        <p:spPr>
-          <a:xfrm>
-            <a:off x="10838859" y="19314095"/>
-            <a:ext cx="7772400" cy="3522518"/>
-          </a:xfrm>
-          <a:prstGeom prst="roundRect">
-            <a:avLst>
-              <a:gd name="adj" fmla="val 8594"/>
-            </a:avLst>
-          </a:prstGeom>
-          <a:solidFill>
-            <a:srgbClr val="FFFFFF">
-              <a:shade val="85000"/>
-            </a:srgbClr>
-          </a:solidFill>
-          <a:ln>
-            <a:noFill/>
-          </a:ln>
-          <a:effectLst>
-            <a:reflection blurRad="12700" endPos="0" dist="5000" dir="5400000" sy="-100000" algn="bl" rotWithShape="0"/>
-          </a:effectLst>
-        </p:spPr>
-      </p:pic>
-      <p:pic>
-        <p:nvPicPr>
-          <p:cNvPr id="16" name="Picture 15" descr="A screenshot of a computer program&#10;&#10;Description automatically generated">
-            <a:extLst>
-              <a:ext uri="{FF2B5EF4-FFF2-40B4-BE49-F238E27FC236}">
-                <a16:creationId xmlns:a16="http://schemas.microsoft.com/office/drawing/2014/main" id="{9F37372E-2274-197C-905A-CF6758A161FC}"/>
-              </a:ext>
-            </a:extLst>
-          </p:cNvPr>
-          <p:cNvPicPr>
-            <a:picLocks noChangeAspect="1"/>
-          </p:cNvPicPr>
-          <p:nvPr/>
-        </p:nvPicPr>
-        <p:blipFill>
-          <a:blip r:embed="rId9">
-            <a:extLst>
-              <a:ext uri="{28A0092B-C50C-407E-A947-70E740481C1C}">
-                <a14:useLocalDpi xmlns:a14="http://schemas.microsoft.com/office/drawing/2010/main" val="0"/>
-              </a:ext>
-            </a:extLst>
-          </a:blip>
-          <a:stretch>
-            <a:fillRect/>
-          </a:stretch>
-        </p:blipFill>
-        <p:spPr>
-          <a:xfrm>
-            <a:off x="10838859" y="25872526"/>
-            <a:ext cx="7772400" cy="4236505"/>
-          </a:xfrm>
-          <a:prstGeom prst="roundRect">
-            <a:avLst>
-              <a:gd name="adj" fmla="val 8594"/>
-            </a:avLst>
-          </a:prstGeom>
-          <a:solidFill>
-            <a:srgbClr val="FFFFFF">
-              <a:shade val="85000"/>
-            </a:srgbClr>
-          </a:solidFill>
-          <a:ln>
-            <a:noFill/>
-          </a:ln>
-          <a:effectLst>
-            <a:reflection blurRad="12700" endPos="0" dist="5000" dir="5400000" sy="-100000" algn="bl" rotWithShape="0"/>
-          </a:effectLst>
-        </p:spPr>
-      </p:pic>
-      <p:pic>
-        <p:nvPicPr>
-          <p:cNvPr id="18" name="Picture 17" descr="A screenshot of a computer program&#10;&#10;Description automatically generated">
-            <a:extLst>
-              <a:ext uri="{FF2B5EF4-FFF2-40B4-BE49-F238E27FC236}">
-                <a16:creationId xmlns:a16="http://schemas.microsoft.com/office/drawing/2014/main" id="{61C8004F-7EEC-6554-D229-DE4A16AC375F}"/>
-              </a:ext>
-            </a:extLst>
-          </p:cNvPr>
-          <p:cNvPicPr>
-            <a:picLocks noChangeAspect="1"/>
-          </p:cNvPicPr>
-          <p:nvPr/>
-        </p:nvPicPr>
-        <p:blipFill>
-          <a:blip r:embed="rId10">
-            <a:extLst>
-              <a:ext uri="{28A0092B-C50C-407E-A947-70E740481C1C}">
-                <a14:useLocalDpi xmlns:a14="http://schemas.microsoft.com/office/drawing/2010/main" val="0"/>
-              </a:ext>
-            </a:extLst>
-          </a:blip>
-          <a:srcRect t="19174"/>
-          <a:stretch/>
-        </p:blipFill>
-        <p:spPr>
-          <a:xfrm>
-            <a:off x="10839897" y="10650538"/>
-            <a:ext cx="6212716" cy="5755731"/>
-          </a:xfrm>
-          <a:prstGeom prst="roundRect">
-            <a:avLst>
-              <a:gd name="adj" fmla="val 8594"/>
-            </a:avLst>
-          </a:prstGeom>
-          <a:solidFill>
-            <a:srgbClr val="FFFFFF">
-              <a:shade val="85000"/>
-            </a:srgbClr>
-          </a:solidFill>
-          <a:ln>
-            <a:noFill/>
-          </a:ln>
-          <a:effectLst>
-            <a:reflection blurRad="12700" endPos="0" dist="5000" dir="5400000" sy="-100000" algn="bl" rotWithShape="0"/>
-          </a:effectLst>
-        </p:spPr>
-      </p:pic>
-      <p:pic>
-        <p:nvPicPr>
           <p:cNvPr id="3" name="Picture 2" descr="A graph showing the number of companies&#10;&#10;Description automatically generated">
             <a:extLst>
               <a:ext uri="{FF2B5EF4-FFF2-40B4-BE49-F238E27FC236}">
@@ -7592,7 +7446,7 @@
           <p:nvPr/>
         </p:nvPicPr>
         <p:blipFill>
-          <a:blip r:embed="rId11">
+          <a:blip r:embed="rId8">
             <a:extLst>
               <a:ext uri="{28A0092B-C50C-407E-A947-70E740481C1C}">
                 <a14:useLocalDpi xmlns:a14="http://schemas.microsoft.com/office/drawing/2010/main" val="0"/>
@@ -7628,7 +7482,7 @@
           <p:nvPr/>
         </p:nvPicPr>
         <p:blipFill>
-          <a:blip r:embed="rId12">
+          <a:blip r:embed="rId9">
             <a:extLst>
               <a:ext uri="{28A0092B-C50C-407E-A947-70E740481C1C}">
                 <a14:useLocalDpi xmlns:a14="http://schemas.microsoft.com/office/drawing/2010/main" val="0"/>
@@ -7664,7 +7518,7 @@
           <p:nvPr/>
         </p:nvPicPr>
         <p:blipFill>
-          <a:blip r:embed="rId13">
+          <a:blip r:embed="rId10">
             <a:extLst>
               <a:ext uri="{28A0092B-C50C-407E-A947-70E740481C1C}">
                 <a14:useLocalDpi xmlns:a14="http://schemas.microsoft.com/office/drawing/2010/main" val="0"/>
@@ -7700,7 +7554,7 @@
           <p:nvPr/>
         </p:nvPicPr>
         <p:blipFill>
-          <a:blip r:embed="rId14">
+          <a:blip r:embed="rId11">
             <a:extLst>
               <a:ext uri="{28A0092B-C50C-407E-A947-70E740481C1C}">
                 <a14:useLocalDpi xmlns:a14="http://schemas.microsoft.com/office/drawing/2010/main" val="0"/>
@@ -7736,7 +7590,7 @@
           <p:nvPr/>
         </p:nvPicPr>
         <p:blipFill>
-          <a:blip r:embed="rId15">
+          <a:blip r:embed="rId12">
             <a:extLst>
               <a:ext uri="{28A0092B-C50C-407E-A947-70E740481C1C}">
                 <a14:useLocalDpi xmlns:a14="http://schemas.microsoft.com/office/drawing/2010/main" val="0"/>
@@ -7786,15 +7640,6 @@
               <a:srgbClr val="FFFFFF"/>
             </a:contourClr>
           </a:sp3d>
-          <a:extLst>
-            <a:ext uri="{909E8E84-426E-40DD-AFC4-6F175D3DCCD1}">
-              <a14:hiddenFill xmlns:a14="http://schemas.microsoft.com/office/drawing/2010/main">
-                <a:solidFill>
-                  <a:srgbClr val="FFFFFF"/>
-                </a:solidFill>
-              </a14:hiddenFill>
-            </a:ext>
-          </a:extLst>
         </p:spPr>
       </p:pic>
       <p:pic>
@@ -7812,7 +7657,7 @@
           <p:nvPr/>
         </p:nvPicPr>
         <p:blipFill rotWithShape="1">
-          <a:blip r:embed="rId16">
+          <a:blip r:embed="rId13">
             <a:extLst>
               <a:ext uri="{28A0092B-C50C-407E-A947-70E740481C1C}">
                 <a14:useLocalDpi xmlns:a14="http://schemas.microsoft.com/office/drawing/2010/main" val="0"/>
@@ -7860,15 +7705,6 @@
               <a:srgbClr val="FFFFFF"/>
             </a:contourClr>
           </a:sp3d>
-          <a:extLst>
-            <a:ext uri="{909E8E84-426E-40DD-AFC4-6F175D3DCCD1}">
-              <a14:hiddenFill xmlns:a14="http://schemas.microsoft.com/office/drawing/2010/main">
-                <a:solidFill>
-                  <a:srgbClr val="FFFFFF"/>
-                </a:solidFill>
-              </a14:hiddenFill>
-            </a:ext>
-          </a:extLst>
         </p:spPr>
       </p:pic>
       <p:sp>
@@ -8076,6 +7912,126 @@
           </a:p>
         </p:txBody>
       </p:sp>
+      <p:pic>
+        <p:nvPicPr>
+          <p:cNvPr id="13" name="Picture 12">
+            <a:extLst>
+              <a:ext uri="{FF2B5EF4-FFF2-40B4-BE49-F238E27FC236}">
+                <a16:creationId xmlns:a16="http://schemas.microsoft.com/office/drawing/2014/main" id="{9724A7FB-DBDC-E3AF-43B5-362791F70838}"/>
+              </a:ext>
+            </a:extLst>
+          </p:cNvPr>
+          <p:cNvPicPr>
+            <a:picLocks noChangeAspect="1"/>
+          </p:cNvPicPr>
+          <p:nvPr/>
+        </p:nvPicPr>
+        <p:blipFill>
+          <a:blip r:embed="rId14"/>
+          <a:stretch>
+            <a:fillRect/>
+          </a:stretch>
+        </p:blipFill>
+        <p:spPr>
+          <a:xfrm>
+            <a:off x="10970263" y="10445294"/>
+            <a:ext cx="6507509" cy="6556286"/>
+          </a:xfrm>
+          <a:prstGeom prst="rect">
+            <a:avLst/>
+          </a:prstGeom>
+          <a:ln>
+            <a:noFill/>
+          </a:ln>
+          <a:effectLst>
+            <a:outerShdw blurRad="292100" dist="139700" dir="2700000" algn="tl" rotWithShape="0">
+              <a:srgbClr val="333333">
+                <a:alpha val="65000"/>
+              </a:srgbClr>
+            </a:outerShdw>
+          </a:effectLst>
+        </p:spPr>
+      </p:pic>
+      <p:pic>
+        <p:nvPicPr>
+          <p:cNvPr id="15" name="Picture 14">
+            <a:extLst>
+              <a:ext uri="{FF2B5EF4-FFF2-40B4-BE49-F238E27FC236}">
+                <a16:creationId xmlns:a16="http://schemas.microsoft.com/office/drawing/2014/main" id="{5E440500-D26D-1B3B-47BD-C2AB307E35D6}"/>
+              </a:ext>
+            </a:extLst>
+          </p:cNvPr>
+          <p:cNvPicPr>
+            <a:picLocks noChangeAspect="1"/>
+          </p:cNvPicPr>
+          <p:nvPr/>
+        </p:nvPicPr>
+        <p:blipFill>
+          <a:blip r:embed="rId15"/>
+          <a:stretch>
+            <a:fillRect/>
+          </a:stretch>
+        </p:blipFill>
+        <p:spPr>
+          <a:xfrm>
+            <a:off x="10970263" y="19287650"/>
+            <a:ext cx="8420384" cy="3816190"/>
+          </a:xfrm>
+          <a:prstGeom prst="rect">
+            <a:avLst/>
+          </a:prstGeom>
+          <a:ln>
+            <a:noFill/>
+          </a:ln>
+          <a:effectLst>
+            <a:outerShdw blurRad="292100" dist="139700" dir="2700000" algn="tl" rotWithShape="0">
+              <a:srgbClr val="333333">
+                <a:alpha val="65000"/>
+              </a:srgbClr>
+            </a:outerShdw>
+          </a:effectLst>
+        </p:spPr>
+      </p:pic>
+      <p:pic>
+        <p:nvPicPr>
+          <p:cNvPr id="17" name="Picture 16">
+            <a:extLst>
+              <a:ext uri="{FF2B5EF4-FFF2-40B4-BE49-F238E27FC236}">
+                <a16:creationId xmlns:a16="http://schemas.microsoft.com/office/drawing/2014/main" id="{47C38A32-A145-FF6F-A79B-FAEEC2246B8A}"/>
+              </a:ext>
+            </a:extLst>
+          </p:cNvPr>
+          <p:cNvPicPr>
+            <a:picLocks noChangeAspect="1"/>
+          </p:cNvPicPr>
+          <p:nvPr/>
+        </p:nvPicPr>
+        <p:blipFill>
+          <a:blip r:embed="rId16"/>
+          <a:stretch>
+            <a:fillRect/>
+          </a:stretch>
+        </p:blipFill>
+        <p:spPr>
+          <a:xfrm>
+            <a:off x="10970263" y="25640431"/>
+            <a:ext cx="9175502" cy="4507963"/>
+          </a:xfrm>
+          <a:prstGeom prst="rect">
+            <a:avLst/>
+          </a:prstGeom>
+          <a:ln>
+            <a:noFill/>
+          </a:ln>
+          <a:effectLst>
+            <a:outerShdw blurRad="292100" dist="139700" dir="2700000" algn="tl" rotWithShape="0">
+              <a:srgbClr val="333333">
+                <a:alpha val="65000"/>
+              </a:srgbClr>
+            </a:outerShdw>
+          </a:effectLst>
+        </p:spPr>
+      </p:pic>
     </p:spTree>
   </p:cSld>
   <p:clrMapOvr>

</xml_diff>

<commit_message>
Added comment about changing q values in conclusion.
</commit_message>
<xml_diff>
--- a/CEMS Poster 430.pptx
+++ b/CEMS Poster 430.pptx
@@ -5238,7 +5238,7 @@
                 <a:latin typeface="Helvetica"/>
                 <a:cs typeface="Helvetica"/>
               </a:rPr>
-              <a:t>). </a:t>
+              <a:t>). When we attempt to change the q value for the algorithm, we see that we’re still at our fastest when q equals 101.</a:t>
             </a:r>
           </a:p>
           <a:p>
@@ -8023,7 +8023,7 @@
         </p:blipFill>
         <p:spPr>
           <a:xfrm>
-            <a:off x="34757410" y="17235534"/>
+            <a:off x="34757410" y="17625624"/>
             <a:ext cx="7190006" cy="4029582"/>
           </a:xfrm>
           <a:prstGeom prst="rect">

</xml_diff>